<commit_message>
Change the key to robert.
</commit_message>
<xml_diff>
--- a/athena-doc/Restful服务框架(Athena) - 介绍 - 李艳鹏.pptx
+++ b/athena-doc/Restful服务框架(Athena) - 介绍 - 李艳鹏.pptx
@@ -34404,7 +34404,7 @@
               <a:pPr>
                 <a:defRPr/>
               </a:pPr>
-              <a:t>5/29/2015</a:t>
+              <a:t>7/14/2015</a:t>
             </a:fld>
             <a:endParaRPr lang="en-US" dirty="0"/>
           </a:p>
@@ -35863,7 +35863,7 @@
             <a:fld id="{061A10BC-4834-46F9-9CB4-286DAC23C842}" type="datetimeFigureOut">
               <a:rPr lang="zh-CN" altLang="en-US" smtClean="0"/>
               <a:pPr/>
-              <a:t>2015/5/29</a:t>
+              <a:t>2015/7/14</a:t>
             </a:fld>
             <a:endParaRPr lang="zh-CN" altLang="en-US"/>
           </a:p>
@@ -35990,7 +35990,7 @@
             <a:fld id="{061A10BC-4834-46F9-9CB4-286DAC23C842}" type="datetimeFigureOut">
               <a:rPr lang="zh-CN" altLang="en-US" smtClean="0"/>
               <a:pPr/>
-              <a:t>2015/5/29</a:t>
+              <a:t>2015/7/14</a:t>
             </a:fld>
             <a:endParaRPr lang="zh-CN" altLang="en-US"/>
           </a:p>
@@ -36087,7 +36087,7 @@
             <a:fld id="{061A10BC-4834-46F9-9CB4-286DAC23C842}" type="datetimeFigureOut">
               <a:rPr lang="zh-CN" altLang="en-US" smtClean="0"/>
               <a:pPr/>
-              <a:t>2015/5/29</a:t>
+              <a:t>2015/7/14</a:t>
             </a:fld>
             <a:endParaRPr lang="zh-CN" altLang="en-US"/>
           </a:p>
@@ -36366,7 +36366,7 @@
             <a:fld id="{061A10BC-4834-46F9-9CB4-286DAC23C842}" type="datetimeFigureOut">
               <a:rPr lang="zh-CN" altLang="en-US" smtClean="0"/>
               <a:pPr/>
-              <a:t>2015/5/29</a:t>
+              <a:t>2015/7/14</a:t>
             </a:fld>
             <a:endParaRPr lang="zh-CN" altLang="en-US"/>
           </a:p>
@@ -36621,7 +36621,7 @@
             <a:fld id="{061A10BC-4834-46F9-9CB4-286DAC23C842}" type="datetimeFigureOut">
               <a:rPr lang="zh-CN" altLang="en-US" smtClean="0"/>
               <a:pPr/>
-              <a:t>2015/5/29</a:t>
+              <a:t>2015/7/14</a:t>
             </a:fld>
             <a:endParaRPr lang="zh-CN" altLang="en-US"/>
           </a:p>
@@ -36793,7 +36793,7 @@
             <a:fld id="{061A10BC-4834-46F9-9CB4-286DAC23C842}" type="datetimeFigureOut">
               <a:rPr lang="zh-CN" altLang="en-US" smtClean="0"/>
               <a:pPr/>
-              <a:t>2015/5/29</a:t>
+              <a:t>2015/7/14</a:t>
             </a:fld>
             <a:endParaRPr lang="zh-CN" altLang="en-US"/>
           </a:p>
@@ -36975,7 +36975,7 @@
             <a:fld id="{061A10BC-4834-46F9-9CB4-286DAC23C842}" type="datetimeFigureOut">
               <a:rPr lang="zh-CN" altLang="en-US" smtClean="0"/>
               <a:pPr/>
-              <a:t>2015/5/29</a:t>
+              <a:t>2015/7/14</a:t>
             </a:fld>
             <a:endParaRPr lang="zh-CN" altLang="en-US"/>
           </a:p>
@@ -37219,7 +37219,7 @@
             <a:fld id="{E59BE0C6-C363-45C4-A271-68F1BEBC1C26}" type="datetimeFigureOut">
               <a:rPr lang="zh-CN" altLang="en-US" smtClean="0"/>
               <a:pPr/>
-              <a:t>2015/5/29</a:t>
+              <a:t>2015/7/14</a:t>
             </a:fld>
             <a:endParaRPr lang="zh-CN" altLang="en-US"/>
           </a:p>
@@ -37391,7 +37391,7 @@
             <a:fld id="{E59BE0C6-C363-45C4-A271-68F1BEBC1C26}" type="datetimeFigureOut">
               <a:rPr lang="zh-CN" altLang="en-US" smtClean="0"/>
               <a:pPr/>
-              <a:t>2015/5/29</a:t>
+              <a:t>2015/7/14</a:t>
             </a:fld>
             <a:endParaRPr lang="zh-CN" altLang="en-US"/>
           </a:p>
@@ -37639,7 +37639,7 @@
             <a:fld id="{E59BE0C6-C363-45C4-A271-68F1BEBC1C26}" type="datetimeFigureOut">
               <a:rPr lang="zh-CN" altLang="en-US" smtClean="0"/>
               <a:pPr/>
-              <a:t>2015/5/29</a:t>
+              <a:t>2015/7/14</a:t>
             </a:fld>
             <a:endParaRPr lang="zh-CN" altLang="en-US"/>
           </a:p>
@@ -37798,60 +37798,6 @@
           </a:p>
         </p:txBody>
       </p:sp>
-      <p:pic>
-        <p:nvPicPr>
-          <p:cNvPr id="4" name="Picture 16" descr="万达标准字(1)"/>
-          <p:cNvPicPr>
-            <a:picLocks noChangeAspect="1" noChangeArrowheads="1"/>
-          </p:cNvPicPr>
-          <p:nvPr userDrawn="1"/>
-        </p:nvPicPr>
-        <p:blipFill>
-          <a:blip r:embed="rId2" cstate="print">
-            <a:extLst>
-              <a:ext uri="{28A0092B-C50C-407E-A947-70E740481C1C}">
-                <a14:useLocalDpi xmlns="" xmlns:a14="http://schemas.microsoft.com/office/drawing/2010/main" val="0"/>
-              </a:ext>
-            </a:extLst>
-          </a:blip>
-          <a:srcRect/>
-          <a:stretch>
-            <a:fillRect/>
-          </a:stretch>
-        </p:blipFill>
-        <p:spPr bwMode="auto">
-          <a:xfrm>
-            <a:off x="471488" y="6453336"/>
-            <a:ext cx="1006757" cy="327231"/>
-          </a:xfrm>
-          <a:prstGeom prst="rect">
-            <a:avLst/>
-          </a:prstGeom>
-          <a:noFill/>
-          <a:ln>
-            <a:noFill/>
-          </a:ln>
-          <a:extLst>
-            <a:ext uri="{909E8E84-426E-40DD-AFC4-6F175D3DCCD1}">
-              <a14:hiddenFill xmlns="" xmlns:a14="http://schemas.microsoft.com/office/drawing/2010/main">
-                <a:solidFill>
-                  <a:srgbClr val="FFFFFF"/>
-                </a:solidFill>
-              </a14:hiddenFill>
-            </a:ext>
-            <a:ext uri="{91240B29-F687-4F45-9708-019B960494DF}">
-              <a14:hiddenLine xmlns="" xmlns:a14="http://schemas.microsoft.com/office/drawing/2010/main" w="9525">
-                <a:solidFill>
-                  <a:srgbClr val="000000"/>
-                </a:solidFill>
-                <a:miter lim="800000"/>
-                <a:headEnd/>
-                <a:tailEnd/>
-              </a14:hiddenLine>
-            </a:ext>
-          </a:extLst>
-        </p:spPr>
-      </p:pic>
     </p:spTree>
     <p:extLst>
       <p:ext uri="{BB962C8B-B14F-4D97-AF65-F5344CB8AC3E}">
@@ -38101,7 +38047,7 @@
             <a:fld id="{E59BE0C6-C363-45C4-A271-68F1BEBC1C26}" type="datetimeFigureOut">
               <a:rPr lang="zh-CN" altLang="en-US" smtClean="0"/>
               <a:pPr/>
-              <a:t>2015/5/29</a:t>
+              <a:t>2015/7/14</a:t>
             </a:fld>
             <a:endParaRPr lang="zh-CN" altLang="en-US"/>
           </a:p>
@@ -38525,7 +38471,7 @@
             <a:fld id="{E59BE0C6-C363-45C4-A271-68F1BEBC1C26}" type="datetimeFigureOut">
               <a:rPr lang="zh-CN" altLang="en-US" smtClean="0"/>
               <a:pPr/>
-              <a:t>2015/5/29</a:t>
+              <a:t>2015/7/14</a:t>
             </a:fld>
             <a:endParaRPr lang="zh-CN" altLang="en-US"/>
           </a:p>
@@ -38645,7 +38591,7 @@
             <a:fld id="{E59BE0C6-C363-45C4-A271-68F1BEBC1C26}" type="datetimeFigureOut">
               <a:rPr lang="zh-CN" altLang="en-US" smtClean="0"/>
               <a:pPr/>
-              <a:t>2015/5/29</a:t>
+              <a:t>2015/7/14</a:t>
             </a:fld>
             <a:endParaRPr lang="zh-CN" altLang="en-US"/>
           </a:p>
@@ -38742,7 +38688,7 @@
             <a:fld id="{E59BE0C6-C363-45C4-A271-68F1BEBC1C26}" type="datetimeFigureOut">
               <a:rPr lang="zh-CN" altLang="en-US" smtClean="0"/>
               <a:pPr/>
-              <a:t>2015/5/29</a:t>
+              <a:t>2015/7/14</a:t>
             </a:fld>
             <a:endParaRPr lang="zh-CN" altLang="en-US"/>
           </a:p>
@@ -39021,7 +38967,7 @@
             <a:fld id="{E59BE0C6-C363-45C4-A271-68F1BEBC1C26}" type="datetimeFigureOut">
               <a:rPr lang="zh-CN" altLang="en-US" smtClean="0"/>
               <a:pPr/>
-              <a:t>2015/5/29</a:t>
+              <a:t>2015/7/14</a:t>
             </a:fld>
             <a:endParaRPr lang="zh-CN" altLang="en-US"/>
           </a:p>
@@ -39276,7 +39222,7 @@
             <a:fld id="{E59BE0C6-C363-45C4-A271-68F1BEBC1C26}" type="datetimeFigureOut">
               <a:rPr lang="zh-CN" altLang="en-US" smtClean="0"/>
               <a:pPr/>
-              <a:t>2015/5/29</a:t>
+              <a:t>2015/7/14</a:t>
             </a:fld>
             <a:endParaRPr lang="zh-CN" altLang="en-US"/>
           </a:p>
@@ -39448,7 +39394,7 @@
             <a:fld id="{E59BE0C6-C363-45C4-A271-68F1BEBC1C26}" type="datetimeFigureOut">
               <a:rPr lang="zh-CN" altLang="en-US" smtClean="0"/>
               <a:pPr/>
-              <a:t>2015/5/29</a:t>
+              <a:t>2015/7/14</a:t>
             </a:fld>
             <a:endParaRPr lang="zh-CN" altLang="en-US"/>
           </a:p>
@@ -39630,7 +39576,7 @@
             <a:fld id="{E59BE0C6-C363-45C4-A271-68F1BEBC1C26}" type="datetimeFigureOut">
               <a:rPr lang="zh-CN" altLang="en-US" smtClean="0"/>
               <a:pPr/>
-              <a:t>2015/5/29</a:t>
+              <a:t>2015/7/14</a:t>
             </a:fld>
             <a:endParaRPr lang="zh-CN" altLang="en-US"/>
           </a:p>
@@ -39874,7 +39820,7 @@
             <a:fld id="{FF95FBAF-30C0-4E53-B7DB-9D84C9EDC8F0}" type="datetimeFigureOut">
               <a:rPr lang="zh-CN" altLang="en-US" smtClean="0"/>
               <a:pPr/>
-              <a:t>2015/5/29</a:t>
+              <a:t>2015/7/14</a:t>
             </a:fld>
             <a:endParaRPr lang="zh-CN" altLang="en-US"/>
           </a:p>
@@ -40046,7 +39992,7 @@
             <a:fld id="{FF95FBAF-30C0-4E53-B7DB-9D84C9EDC8F0}" type="datetimeFigureOut">
               <a:rPr lang="zh-CN" altLang="en-US" smtClean="0"/>
               <a:pPr/>
-              <a:t>2015/5/29</a:t>
+              <a:t>2015/7/14</a:t>
             </a:fld>
             <a:endParaRPr lang="zh-CN" altLang="en-US"/>
           </a:p>
@@ -40571,7 +40517,7 @@
             <a:fld id="{FF95FBAF-30C0-4E53-B7DB-9D84C9EDC8F0}" type="datetimeFigureOut">
               <a:rPr lang="zh-CN" altLang="en-US" smtClean="0"/>
               <a:pPr/>
-              <a:t>2015/5/29</a:t>
+              <a:t>2015/7/14</a:t>
             </a:fld>
             <a:endParaRPr lang="zh-CN" altLang="en-US"/>
           </a:p>
@@ -40861,7 +40807,7 @@
             <a:fld id="{FF95FBAF-30C0-4E53-B7DB-9D84C9EDC8F0}" type="datetimeFigureOut">
               <a:rPr lang="zh-CN" altLang="en-US" smtClean="0"/>
               <a:pPr/>
-              <a:t>2015/5/29</a:t>
+              <a:t>2015/7/14</a:t>
             </a:fld>
             <a:endParaRPr lang="zh-CN" altLang="en-US"/>
           </a:p>
@@ -41285,7 +41231,7 @@
             <a:fld id="{FF95FBAF-30C0-4E53-B7DB-9D84C9EDC8F0}" type="datetimeFigureOut">
               <a:rPr lang="zh-CN" altLang="en-US" smtClean="0"/>
               <a:pPr/>
-              <a:t>2015/5/29</a:t>
+              <a:t>2015/7/14</a:t>
             </a:fld>
             <a:endParaRPr lang="zh-CN" altLang="en-US"/>
           </a:p>
@@ -41405,7 +41351,7 @@
             <a:fld id="{FF95FBAF-30C0-4E53-B7DB-9D84C9EDC8F0}" type="datetimeFigureOut">
               <a:rPr lang="zh-CN" altLang="en-US" smtClean="0"/>
               <a:pPr/>
-              <a:t>2015/5/29</a:t>
+              <a:t>2015/7/14</a:t>
             </a:fld>
             <a:endParaRPr lang="zh-CN" altLang="en-US"/>
           </a:p>
@@ -41502,7 +41448,7 @@
             <a:fld id="{FF95FBAF-30C0-4E53-B7DB-9D84C9EDC8F0}" type="datetimeFigureOut">
               <a:rPr lang="zh-CN" altLang="en-US" smtClean="0"/>
               <a:pPr/>
-              <a:t>2015/5/29</a:t>
+              <a:t>2015/7/14</a:t>
             </a:fld>
             <a:endParaRPr lang="zh-CN" altLang="en-US"/>
           </a:p>
@@ -41781,7 +41727,7 @@
             <a:fld id="{FF95FBAF-30C0-4E53-B7DB-9D84C9EDC8F0}" type="datetimeFigureOut">
               <a:rPr lang="zh-CN" altLang="en-US" smtClean="0"/>
               <a:pPr/>
-              <a:t>2015/5/29</a:t>
+              <a:t>2015/7/14</a:t>
             </a:fld>
             <a:endParaRPr lang="zh-CN" altLang="en-US"/>
           </a:p>
@@ -42036,7 +41982,7 @@
             <a:fld id="{FF95FBAF-30C0-4E53-B7DB-9D84C9EDC8F0}" type="datetimeFigureOut">
               <a:rPr lang="zh-CN" altLang="en-US" smtClean="0"/>
               <a:pPr/>
-              <a:t>2015/5/29</a:t>
+              <a:t>2015/7/14</a:t>
             </a:fld>
             <a:endParaRPr lang="zh-CN" altLang="en-US"/>
           </a:p>
@@ -42208,7 +42154,7 @@
             <a:fld id="{FF95FBAF-30C0-4E53-B7DB-9D84C9EDC8F0}" type="datetimeFigureOut">
               <a:rPr lang="zh-CN" altLang="en-US" smtClean="0"/>
               <a:pPr/>
-              <a:t>2015/5/29</a:t>
+              <a:t>2015/7/14</a:t>
             </a:fld>
             <a:endParaRPr lang="zh-CN" altLang="en-US"/>
           </a:p>
@@ -42397,7 +42343,7 @@
             <a:fld id="{FF95FBAF-30C0-4E53-B7DB-9D84C9EDC8F0}" type="datetimeFigureOut">
               <a:rPr lang="zh-CN" altLang="en-US" smtClean="0"/>
               <a:pPr/>
-              <a:t>2015/5/29</a:t>
+              <a:t>2015/7/14</a:t>
             </a:fld>
             <a:endParaRPr lang="zh-CN" altLang="en-US"/>
           </a:p>
@@ -42724,7 +42670,7 @@
             <a:fld id="{061A10BC-4834-46F9-9CB4-286DAC23C842}" type="datetimeFigureOut">
               <a:rPr lang="zh-CN" altLang="en-US" smtClean="0"/>
               <a:pPr/>
-              <a:t>2015/5/29</a:t>
+              <a:t>2015/7/14</a:t>
             </a:fld>
             <a:endParaRPr lang="zh-CN" altLang="en-US"/>
           </a:p>
@@ -42903,7 +42849,7 @@
             <a:fld id="{061A10BC-4834-46F9-9CB4-286DAC23C842}" type="datetimeFigureOut">
               <a:rPr lang="zh-CN" altLang="en-US" smtClean="0"/>
               <a:pPr/>
-              <a:t>2015/5/29</a:t>
+              <a:t>2015/7/14</a:t>
             </a:fld>
             <a:endParaRPr lang="zh-CN" altLang="en-US"/>
           </a:p>
@@ -43158,7 +43104,7 @@
             <a:fld id="{061A10BC-4834-46F9-9CB4-286DAC23C842}" type="datetimeFigureOut">
               <a:rPr lang="zh-CN" altLang="en-US" smtClean="0"/>
               <a:pPr/>
-              <a:t>2015/5/29</a:t>
+              <a:t>2015/7/14</a:t>
             </a:fld>
             <a:endParaRPr lang="zh-CN" altLang="en-US"/>
           </a:p>
@@ -43455,7 +43401,7 @@
             <a:fld id="{061A10BC-4834-46F9-9CB4-286DAC23C842}" type="datetimeFigureOut">
               <a:rPr lang="zh-CN" altLang="en-US" smtClean="0"/>
               <a:pPr/>
-              <a:t>2015/5/29</a:t>
+              <a:t>2015/7/14</a:t>
             </a:fld>
             <a:endParaRPr lang="zh-CN" altLang="en-US"/>
           </a:p>
@@ -43930,60 +43876,6 @@
           </a:p>
         </p:txBody>
       </p:sp>
-      <p:pic>
-        <p:nvPicPr>
-          <p:cNvPr id="10" name="Picture 16" descr="万达标准字(1)"/>
-          <p:cNvPicPr>
-            <a:picLocks noChangeAspect="1" noChangeArrowheads="1"/>
-          </p:cNvPicPr>
-          <p:nvPr userDrawn="1"/>
-        </p:nvPicPr>
-        <p:blipFill>
-          <a:blip r:embed="rId7" cstate="print">
-            <a:extLst>
-              <a:ext uri="{28A0092B-C50C-407E-A947-70E740481C1C}">
-                <a14:useLocalDpi xmlns="" xmlns:a14="http://schemas.microsoft.com/office/drawing/2010/main" val="0"/>
-              </a:ext>
-            </a:extLst>
-          </a:blip>
-          <a:srcRect/>
-          <a:stretch>
-            <a:fillRect/>
-          </a:stretch>
-        </p:blipFill>
-        <p:spPr bwMode="auto">
-          <a:xfrm>
-            <a:off x="482600" y="6411521"/>
-            <a:ext cx="1006757" cy="327231"/>
-          </a:xfrm>
-          <a:prstGeom prst="rect">
-            <a:avLst/>
-          </a:prstGeom>
-          <a:noFill/>
-          <a:ln>
-            <a:noFill/>
-          </a:ln>
-          <a:extLst>
-            <a:ext uri="{909E8E84-426E-40DD-AFC4-6F175D3DCCD1}">
-              <a14:hiddenFill xmlns="" xmlns:a14="http://schemas.microsoft.com/office/drawing/2010/main">
-                <a:solidFill>
-                  <a:srgbClr val="FFFFFF"/>
-                </a:solidFill>
-              </a14:hiddenFill>
-            </a:ext>
-            <a:ext uri="{91240B29-F687-4F45-9708-019B960494DF}">
-              <a14:hiddenLine xmlns="" xmlns:a14="http://schemas.microsoft.com/office/drawing/2010/main" w="9525">
-                <a:solidFill>
-                  <a:srgbClr val="000000"/>
-                </a:solidFill>
-                <a:miter lim="800000"/>
-                <a:headEnd/>
-                <a:tailEnd/>
-              </a14:hiddenLine>
-            </a:ext>
-          </a:extLst>
-        </p:spPr>
-      </p:pic>
       <p:sp>
         <p:nvSpPr>
           <p:cNvPr id="11" name="Rectangle 9"/>
@@ -44019,7 +43911,7 @@
               <a:defRPr/>
             </a:pPr>
             <a:r>
-              <a:rPr lang="zh-CN" altLang="en-GB" sz="1200" b="1" i="0" baseline="0" dirty="0">
+              <a:rPr lang="en-US" altLang="zh-CN" sz="1200" b="1" i="0" baseline="0" dirty="0" smtClean="0">
                 <a:solidFill>
                   <a:schemeClr val="accent2">
                     <a:lumMod val="50000"/>
@@ -44027,8 +43919,16 @@
                 </a:solidFill>
                 <a:ea typeface="黑体" pitchFamily="49" charset="-122"/>
               </a:rPr>
-              <a:t>万达集团信息管理中心</a:t>
+              <a:t>http://athena.cloudate.net</a:t>
             </a:r>
+            <a:endParaRPr lang="zh-CN" altLang="en-GB" sz="1200" b="1" i="0" baseline="0" dirty="0">
+              <a:solidFill>
+                <a:schemeClr val="accent2">
+                  <a:lumMod val="50000"/>
+                </a:schemeClr>
+              </a:solidFill>
+              <a:ea typeface="黑体" pitchFamily="49" charset="-122"/>
+            </a:endParaRPr>
           </a:p>
         </p:txBody>
       </p:sp>
@@ -44707,7 +44607,7 @@
             <a:fld id="{061A10BC-4834-46F9-9CB4-286DAC23C842}" type="datetimeFigureOut">
               <a:rPr lang="zh-CN" altLang="en-US" smtClean="0"/>
               <a:pPr/>
-              <a:t>2015/5/29</a:t>
+              <a:t>2015/7/14</a:t>
             </a:fld>
             <a:endParaRPr lang="zh-CN" altLang="en-US"/>
           </a:p>
@@ -45226,7 +45126,7 @@
             <a:fld id="{E59BE0C6-C363-45C4-A271-68F1BEBC1C26}" type="datetimeFigureOut">
               <a:rPr lang="zh-CN" altLang="en-US" smtClean="0"/>
               <a:pPr/>
-              <a:t>2015/5/29</a:t>
+              <a:t>2015/7/14</a:t>
             </a:fld>
             <a:endParaRPr lang="zh-CN" altLang="en-US"/>
           </a:p>
@@ -45745,7 +45645,7 @@
             <a:fld id="{FF95FBAF-30C0-4E53-B7DB-9D84C9EDC8F0}" type="datetimeFigureOut">
               <a:rPr lang="zh-CN" altLang="en-US" smtClean="0"/>
               <a:pPr/>
-              <a:t>2015/5/29</a:t>
+              <a:t>2015/7/14</a:t>
             </a:fld>
             <a:endParaRPr lang="zh-CN" altLang="en-US"/>
           </a:p>
@@ -46158,7 +46058,7 @@
             </a:pPr>
             <a:r>
               <a:rPr lang="zh-CN" altLang="en-US" sz="4400" dirty="0" smtClean="0"/>
-              <a:t>万达电商</a:t>
+              <a:t>云时代网</a:t>
             </a:r>
             <a:r>
               <a:rPr lang="en-US" altLang="zh-CN" sz="4400" dirty="0" smtClean="0"/>
@@ -46176,72 +46076,16 @@
           </a:p>
         </p:txBody>
       </p:sp>
-      <p:sp>
-        <p:nvSpPr>
-          <p:cNvPr id="4" name="Subtitle 1"/>
-          <p:cNvSpPr>
-            <a:spLocks noGrp="1"/>
-          </p:cNvSpPr>
-          <p:nvPr>
-            <p:ph type="subTitle" idx="1"/>
-          </p:nvPr>
-        </p:nvSpPr>
-        <p:spPr>
-          <a:xfrm>
-            <a:off x="427832" y="5295578"/>
-            <a:ext cx="8323890" cy="653702"/>
-          </a:xfrm>
-        </p:spPr>
-        <p:txBody>
-          <a:bodyPr/>
-          <a:lstStyle/>
-          <a:p>
-            <a:pPr>
-              <a:lnSpc>
-                <a:spcPct val="100000"/>
-              </a:lnSpc>
-              <a:spcBef>
-                <a:spcPts val="600"/>
-              </a:spcBef>
-              <a:spcAft>
-                <a:spcPts val="0"/>
-              </a:spcAft>
-            </a:pPr>
-            <a:r>
-              <a:rPr lang="zh-CN" altLang="en-US" sz="1800" dirty="0" smtClean="0">
-                <a:solidFill>
-                  <a:schemeClr val="tx1"/>
-                </a:solidFill>
-              </a:rPr>
-              <a:t>李艳鹏  </a:t>
-            </a:r>
-            <a:r>
-              <a:rPr lang="en-US" altLang="zh-CN" sz="1800" dirty="0" smtClean="0">
-                <a:solidFill>
-                  <a:schemeClr val="tx1"/>
-                </a:solidFill>
-              </a:rPr>
-              <a:t>2015-5-9  liyanpeng5</a:t>
-            </a:r>
-          </a:p>
-        </p:txBody>
-      </p:sp>
       <p:pic>
         <p:nvPicPr>
-          <p:cNvPr id="7" name="Picture 16" descr="万达标准字(1)"/>
+          <p:cNvPr id="5" name="Picture 3"/>
           <p:cNvPicPr>
             <a:picLocks noChangeAspect="1" noChangeArrowheads="1"/>
           </p:cNvPicPr>
           <p:nvPr/>
         </p:nvPicPr>
         <p:blipFill>
-          <a:blip r:embed="rId3" cstate="print">
-            <a:extLst>
-              <a:ext uri="{28A0092B-C50C-407E-A947-70E740481C1C}">
-                <a14:useLocalDpi xmlns="" xmlns:a14="http://schemas.microsoft.com/office/drawing/2010/main" val="0"/>
-              </a:ext>
-            </a:extLst>
-          </a:blip>
+          <a:blip r:embed="rId3"/>
           <a:srcRect/>
           <a:stretch>
             <a:fillRect/>
@@ -46249,8 +46093,34 @@
         </p:blipFill>
         <p:spPr bwMode="auto">
           <a:xfrm>
-            <a:off x="6263954" y="260648"/>
-            <a:ext cx="2541587" cy="825500"/>
+            <a:off x="6505602" y="357166"/>
+            <a:ext cx="1924050" cy="457200"/>
+          </a:xfrm>
+          <a:prstGeom prst="rect">
+            <a:avLst/>
+          </a:prstGeom>
+          <a:noFill/>
+          <a:ln w="9525">
+            <a:noFill/>
+            <a:miter lim="800000"/>
+            <a:headEnd/>
+            <a:tailEnd/>
+          </a:ln>
+          <a:effectLst/>
+        </p:spPr>
+      </p:pic>
+      <p:sp>
+        <p:nvSpPr>
+          <p:cNvPr id="6" name="Subtitle 1"/>
+          <p:cNvSpPr txBox="1">
+            <a:spLocks/>
+          </p:cNvSpPr>
+          <p:nvPr/>
+        </p:nvSpPr>
+        <p:spPr bwMode="auto">
+          <a:xfrm>
+            <a:off x="5749300" y="857232"/>
+            <a:ext cx="3394700" cy="357190"/>
           </a:xfrm>
           <a:prstGeom prst="rect">
             <a:avLst/>
@@ -46279,7 +46149,244 @@
             </a:ext>
           </a:extLst>
         </p:spPr>
-      </p:pic>
+        <p:txBody>
+          <a:bodyPr vert="horz" wrap="none" lIns="0" tIns="0" rIns="0" bIns="0" numCol="1" anchor="t" anchorCtr="0" compatLnSpc="1">
+            <a:prstTxWarp prst="textNoShape">
+              <a:avLst/>
+            </a:prstTxWarp>
+          </a:bodyPr>
+          <a:lstStyle/>
+          <a:p>
+            <a:pPr marL="342900" marR="0" lvl="0" indent="-342900" algn="ctr" defTabSz="914400" rtl="0" eaLnBrk="0" fontAlgn="base" latinLnBrk="0" hangingPunct="0">
+              <a:lnSpc>
+                <a:spcPct val="100000"/>
+              </a:lnSpc>
+              <a:spcBef>
+                <a:spcPts val="600"/>
+              </a:spcBef>
+              <a:spcAft>
+                <a:spcPts val="0"/>
+              </a:spcAft>
+              <a:buClr>
+                <a:schemeClr val="accent1"/>
+              </a:buClr>
+              <a:buSzTx/>
+              <a:buFont typeface="Futura Md BT" pitchFamily="34" charset="0"/>
+              <a:buNone/>
+              <a:tabLst>
+                <a:tab pos="3946525" algn="l"/>
+              </a:tabLst>
+              <a:defRPr/>
+            </a:pPr>
+            <a:r>
+              <a:rPr kumimoji="0" lang="en-US" altLang="zh-CN" sz="1600" b="1" i="0" u="none" strike="noStrike" kern="0" cap="none" spc="0" normalizeH="0" baseline="0" noProof="0" dirty="0" smtClean="0">
+                <a:ln>
+                  <a:noFill/>
+                </a:ln>
+                <a:solidFill>
+                  <a:schemeClr val="bg1">
+                    <a:lumMod val="50000"/>
+                  </a:schemeClr>
+                </a:solidFill>
+                <a:effectLst/>
+                <a:uLnTx/>
+                <a:uFillTx/>
+                <a:latin typeface="微软雅黑" pitchFamily="34" charset="-122"/>
+                <a:ea typeface="微软雅黑" pitchFamily="34" charset="-122"/>
+                <a:cs typeface="+mn-cs"/>
+              </a:rPr>
+              <a:t>http://vesta.cloudate.net</a:t>
+            </a:r>
+          </a:p>
+        </p:txBody>
+      </p:sp>
+      <p:sp>
+        <p:nvSpPr>
+          <p:cNvPr id="9" name="Subtitle 1"/>
+          <p:cNvSpPr txBox="1">
+            <a:spLocks/>
+          </p:cNvSpPr>
+          <p:nvPr/>
+        </p:nvSpPr>
+        <p:spPr bwMode="auto">
+          <a:xfrm>
+            <a:off x="427832" y="5295578"/>
+            <a:ext cx="8323890" cy="919504"/>
+          </a:xfrm>
+          <a:prstGeom prst="rect">
+            <a:avLst/>
+          </a:prstGeom>
+          <a:noFill/>
+          <a:ln>
+            <a:noFill/>
+          </a:ln>
+          <a:extLst>
+            <a:ext uri="{909E8E84-426E-40DD-AFC4-6F175D3DCCD1}">
+              <a14:hiddenFill xmlns="" xmlns:a14="http://schemas.microsoft.com/office/drawing/2010/main">
+                <a:solidFill>
+                  <a:srgbClr val="FFFFFF"/>
+                </a:solidFill>
+              </a14:hiddenFill>
+            </a:ext>
+            <a:ext uri="{91240B29-F687-4F45-9708-019B960494DF}">
+              <a14:hiddenLine xmlns="" xmlns:a14="http://schemas.microsoft.com/office/drawing/2010/main" w="9525">
+                <a:solidFill>
+                  <a:srgbClr val="000000"/>
+                </a:solidFill>
+                <a:miter lim="800000"/>
+                <a:headEnd/>
+                <a:tailEnd/>
+              </a14:hiddenLine>
+            </a:ext>
+          </a:extLst>
+        </p:spPr>
+        <p:txBody>
+          <a:bodyPr vert="horz" wrap="none" lIns="0" tIns="0" rIns="0" bIns="0" numCol="1" anchor="t" anchorCtr="0" compatLnSpc="1">
+            <a:prstTxWarp prst="textNoShape">
+              <a:avLst/>
+            </a:prstTxWarp>
+          </a:bodyPr>
+          <a:lstStyle/>
+          <a:p>
+            <a:pPr marL="342900" marR="0" lvl="0" indent="-342900" algn="ctr" defTabSz="914400" rtl="0" eaLnBrk="0" fontAlgn="base" latinLnBrk="0" hangingPunct="0">
+              <a:lnSpc>
+                <a:spcPct val="100000"/>
+              </a:lnSpc>
+              <a:spcBef>
+                <a:spcPts val="600"/>
+              </a:spcBef>
+              <a:spcAft>
+                <a:spcPts val="0"/>
+              </a:spcAft>
+              <a:buClr>
+                <a:schemeClr val="accent1"/>
+              </a:buClr>
+              <a:buSzTx/>
+              <a:buFont typeface="Futura Md BT" pitchFamily="34" charset="0"/>
+              <a:buNone/>
+              <a:tabLst>
+                <a:tab pos="3946525" algn="l"/>
+              </a:tabLst>
+              <a:defRPr/>
+            </a:pPr>
+            <a:r>
+              <a:rPr kumimoji="0" lang="zh-CN" altLang="en-US" sz="1600" b="1" i="0" u="none" strike="noStrike" kern="0" cap="none" spc="0" normalizeH="0" baseline="0" noProof="0" smtClean="0">
+                <a:ln>
+                  <a:noFill/>
+                </a:ln>
+                <a:solidFill>
+                  <a:schemeClr val="bg1">
+                    <a:lumMod val="50000"/>
+                  </a:schemeClr>
+                </a:solidFill>
+                <a:effectLst/>
+                <a:uLnTx/>
+                <a:uFillTx/>
+                <a:latin typeface="微软雅黑" pitchFamily="34" charset="-122"/>
+                <a:ea typeface="微软雅黑" pitchFamily="34" charset="-122"/>
+                <a:cs typeface="+mn-cs"/>
+              </a:rPr>
+              <a:t>罗伯特  </a:t>
+            </a:r>
+            <a:r>
+              <a:rPr kumimoji="0" lang="en-US" altLang="zh-CN" sz="1600" b="1" i="0" u="none" strike="noStrike" kern="0" cap="none" spc="0" normalizeH="0" baseline="0" noProof="0" smtClean="0">
+                <a:ln>
+                  <a:noFill/>
+                </a:ln>
+                <a:solidFill>
+                  <a:schemeClr val="bg1">
+                    <a:lumMod val="50000"/>
+                  </a:schemeClr>
+                </a:solidFill>
+                <a:effectLst/>
+                <a:uLnTx/>
+                <a:uFillTx/>
+                <a:latin typeface="微软雅黑" pitchFamily="34" charset="-122"/>
+                <a:ea typeface="微软雅黑" pitchFamily="34" charset="-122"/>
+                <a:cs typeface="+mn-cs"/>
+              </a:rPr>
+              <a:t>2015-6-3  </a:t>
+            </a:r>
+          </a:p>
+          <a:p>
+            <a:pPr marL="342900" marR="0" lvl="0" indent="-342900" algn="ctr" defTabSz="914400" rtl="0" eaLnBrk="0" fontAlgn="base" latinLnBrk="0" hangingPunct="0">
+              <a:lnSpc>
+                <a:spcPct val="100000"/>
+              </a:lnSpc>
+              <a:spcBef>
+                <a:spcPts val="600"/>
+              </a:spcBef>
+              <a:spcAft>
+                <a:spcPts val="0"/>
+              </a:spcAft>
+              <a:buClr>
+                <a:schemeClr val="accent1"/>
+              </a:buClr>
+              <a:buSzTx/>
+              <a:buFont typeface="Futura Md BT" pitchFamily="34" charset="0"/>
+              <a:buNone/>
+              <a:tabLst>
+                <a:tab pos="3946525" algn="l"/>
+              </a:tabLst>
+              <a:defRPr/>
+            </a:pPr>
+            <a:r>
+              <a:rPr kumimoji="0" lang="zh-CN" altLang="en-US" sz="1600" b="1" i="0" u="none" strike="noStrike" kern="0" cap="none" spc="0" normalizeH="0" baseline="0" noProof="0" smtClean="0">
+                <a:ln>
+                  <a:noFill/>
+                </a:ln>
+                <a:solidFill>
+                  <a:schemeClr val="bg1">
+                    <a:lumMod val="50000"/>
+                  </a:schemeClr>
+                </a:solidFill>
+                <a:effectLst/>
+                <a:uLnTx/>
+                <a:uFillTx/>
+                <a:latin typeface="微软雅黑" pitchFamily="34" charset="-122"/>
+                <a:ea typeface="微软雅黑" pitchFamily="34" charset="-122"/>
+                <a:cs typeface="+mn-cs"/>
+              </a:rPr>
+              <a:t>微信：</a:t>
+            </a:r>
+            <a:r>
+              <a:rPr kumimoji="0" lang="en-US" altLang="zh-CN" sz="1600" b="1" i="0" u="none" strike="noStrike" kern="0" cap="none" spc="0" normalizeH="0" baseline="0" noProof="0" smtClean="0">
+                <a:ln>
+                  <a:noFill/>
+                </a:ln>
+                <a:solidFill>
+                  <a:schemeClr val="bg1">
+                    <a:lumMod val="50000"/>
+                  </a:schemeClr>
+                </a:solidFill>
+                <a:effectLst/>
+                <a:uLnTx/>
+                <a:uFillTx/>
+                <a:latin typeface="微软雅黑" pitchFamily="34" charset="-122"/>
+                <a:ea typeface="微软雅黑" pitchFamily="34" charset="-122"/>
+                <a:cs typeface="+mn-cs"/>
+              </a:rPr>
+              <a:t>13436881186</a:t>
+            </a:r>
+            <a:endParaRPr kumimoji="0" lang="en-US" altLang="zh-CN" sz="1600" b="1" i="0" u="none" strike="noStrike" kern="0" cap="none" spc="0" normalizeH="0" baseline="0" noProof="0" dirty="0" smtClean="0">
+              <a:ln>
+                <a:noFill/>
+              </a:ln>
+              <a:solidFill>
+                <a:schemeClr val="bg1">
+                  <a:lumMod val="50000"/>
+                </a:schemeClr>
+              </a:solidFill>
+              <a:effectLst/>
+              <a:uLnTx/>
+              <a:uFillTx/>
+              <a:latin typeface="微软雅黑" pitchFamily="34" charset="-122"/>
+              <a:ea typeface="微软雅黑" pitchFamily="34" charset="-122"/>
+              <a:cs typeface="+mn-cs"/>
+            </a:endParaRPr>
+          </a:p>
+        </p:txBody>
+      </p:sp>
     </p:spTree>
   </p:cSld>
   <p:clrMapOvr>
@@ -49905,14 +50012,24 @@
           <a:p>
             <a:pPr algn="ctr"/>
             <a:r>
-              <a:rPr lang="zh-CN" altLang="en-US" sz="4800" b="1" dirty="0">
+              <a:rPr lang="zh-CN" altLang="en-US" sz="4800" b="1" dirty="0" smtClean="0">
                 <a:solidFill>
                   <a:schemeClr val="bg1"/>
                 </a:solidFill>
                 <a:latin typeface="微软雅黑" pitchFamily="34" charset="-122"/>
                 <a:ea typeface="微软雅黑" pitchFamily="34" charset="-122"/>
               </a:rPr>
-              <a:t>汇报完毕</a:t>
+              <a:t>演示</a:t>
+            </a:r>
+            <a:r>
+              <a:rPr lang="zh-CN" altLang="en-US" sz="4800" b="1" dirty="0" smtClean="0">
+                <a:solidFill>
+                  <a:schemeClr val="bg1"/>
+                </a:solidFill>
+                <a:latin typeface="微软雅黑" pitchFamily="34" charset="-122"/>
+                <a:ea typeface="微软雅黑" pitchFamily="34" charset="-122"/>
+              </a:rPr>
+              <a:t>完毕</a:t>
             </a:r>
             <a:endParaRPr lang="en-US" altLang="zh-CN" sz="4800" b="1" dirty="0">
               <a:solidFill>
@@ -49925,14 +50042,14 @@
           <a:p>
             <a:pPr algn="ctr"/>
             <a:r>
-              <a:rPr lang="zh-CN" altLang="en-US" sz="4800" b="1" dirty="0">
+              <a:rPr lang="en-US" altLang="zh-CN" sz="4800" b="1" dirty="0" smtClean="0">
                 <a:solidFill>
                   <a:schemeClr val="bg1"/>
                 </a:solidFill>
                 <a:latin typeface="微软雅黑" pitchFamily="34" charset="-122"/>
                 <a:ea typeface="微软雅黑" pitchFamily="34" charset="-122"/>
               </a:rPr>
-              <a:t>请领导指示</a:t>
+              <a:t>Q/A</a:t>
             </a:r>
             <a:endParaRPr lang="fr-FR" altLang="zh-CN" sz="4800" b="1" dirty="0">
               <a:solidFill>

</xml_diff>